<commit_message>
Added links to ppt
Added links to ppt
</commit_message>
<xml_diff>
--- a/House Price Prediction.pptx
+++ b/House Price Prediction.pptx
@@ -6762,6 +6762,19 @@
             </a:r>
           </a:p>
           <a:p>
+            <a:r>
+              <a:rPr lang="en-AU" sz="1400" dirty="0"/>
+              <a:t>Kaggle link: </a:t>
+            </a:r>
+            <a:r>
+              <a:rPr lang="en-AU" sz="1050" dirty="0">
+                <a:hlinkClick r:id="rId2"/>
+              </a:rPr>
+              <a:t>https://www.kaggle.com/c/house-prices-advanced-regression-techniques/</a:t>
+            </a:r>
+            <a:endParaRPr lang="en-AU" sz="1400" dirty="0"/>
+          </a:p>
+          <a:p>
             <a:pPr marL="0" indent="0">
               <a:buNone/>
             </a:pPr>

</xml_diff>